<commit_message>
LA FIN DE LA FIN
</commit_message>
<xml_diff>
--- a/PRESENTATION-SergiyMirochnyk-_2_30032021.pptx
+++ b/PRESENTATION-SergiyMirochnyk-_2_30032021.pptx
@@ -7,18 +7,12 @@
   <p:sldIdLst>
     <p:sldId id="256" r:id="rId2"/>
     <p:sldId id="257" r:id="rId3"/>
-    <p:sldId id="261" r:id="rId4"/>
-    <p:sldId id="258" r:id="rId5"/>
-    <p:sldId id="262" r:id="rId6"/>
-    <p:sldId id="259" r:id="rId7"/>
-    <p:sldId id="263" r:id="rId8"/>
-    <p:sldId id="264" r:id="rId9"/>
-    <p:sldId id="265" r:id="rId10"/>
-    <p:sldId id="266" r:id="rId11"/>
-    <p:sldId id="268" r:id="rId12"/>
-    <p:sldId id="269" r:id="rId13"/>
-    <p:sldId id="270" r:id="rId14"/>
-    <p:sldId id="271" r:id="rId15"/>
+    <p:sldId id="273" r:id="rId4"/>
+    <p:sldId id="261" r:id="rId5"/>
+    <p:sldId id="258" r:id="rId6"/>
+    <p:sldId id="262" r:id="rId7"/>
+    <p:sldId id="259" r:id="rId8"/>
+    <p:sldId id="271" r:id="rId9"/>
   </p:sldIdLst>
   <p:sldSz cx="12192000" cy="6858000"/>
   <p:notesSz cx="6858000" cy="9144000"/>
@@ -274,7 +268,7 @@
           <a:p>
             <a:fld id="{617D1E1C-FC9C-4CA1-89DF-7703407434D4}" type="datetimeFigureOut">
               <a:rPr lang="ru-RU" smtClean="0"/>
-              <a:t>09.05.2021</a:t>
+              <a:t>10.05.2021</a:t>
             </a:fld>
             <a:endParaRPr lang="ru-RU"/>
           </a:p>
@@ -474,7 +468,7 @@
           <a:p>
             <a:fld id="{617D1E1C-FC9C-4CA1-89DF-7703407434D4}" type="datetimeFigureOut">
               <a:rPr lang="ru-RU" smtClean="0"/>
-              <a:t>09.05.2021</a:t>
+              <a:t>10.05.2021</a:t>
             </a:fld>
             <a:endParaRPr lang="ru-RU"/>
           </a:p>
@@ -684,7 +678,7 @@
           <a:p>
             <a:fld id="{617D1E1C-FC9C-4CA1-89DF-7703407434D4}" type="datetimeFigureOut">
               <a:rPr lang="ru-RU" smtClean="0"/>
-              <a:t>09.05.2021</a:t>
+              <a:t>10.05.2021</a:t>
             </a:fld>
             <a:endParaRPr lang="ru-RU"/>
           </a:p>
@@ -884,7 +878,7 @@
           <a:p>
             <a:fld id="{617D1E1C-FC9C-4CA1-89DF-7703407434D4}" type="datetimeFigureOut">
               <a:rPr lang="ru-RU" smtClean="0"/>
-              <a:t>09.05.2021</a:t>
+              <a:t>10.05.2021</a:t>
             </a:fld>
             <a:endParaRPr lang="ru-RU"/>
           </a:p>
@@ -1160,7 +1154,7 @@
           <a:p>
             <a:fld id="{617D1E1C-FC9C-4CA1-89DF-7703407434D4}" type="datetimeFigureOut">
               <a:rPr lang="ru-RU" smtClean="0"/>
-              <a:t>09.05.2021</a:t>
+              <a:t>10.05.2021</a:t>
             </a:fld>
             <a:endParaRPr lang="ru-RU"/>
           </a:p>
@@ -1428,7 +1422,7 @@
           <a:p>
             <a:fld id="{617D1E1C-FC9C-4CA1-89DF-7703407434D4}" type="datetimeFigureOut">
               <a:rPr lang="ru-RU" smtClean="0"/>
-              <a:t>09.05.2021</a:t>
+              <a:t>10.05.2021</a:t>
             </a:fld>
             <a:endParaRPr lang="ru-RU"/>
           </a:p>
@@ -1843,7 +1837,7 @@
           <a:p>
             <a:fld id="{617D1E1C-FC9C-4CA1-89DF-7703407434D4}" type="datetimeFigureOut">
               <a:rPr lang="ru-RU" smtClean="0"/>
-              <a:t>09.05.2021</a:t>
+              <a:t>10.05.2021</a:t>
             </a:fld>
             <a:endParaRPr lang="ru-RU"/>
           </a:p>
@@ -1985,7 +1979,7 @@
           <a:p>
             <a:fld id="{617D1E1C-FC9C-4CA1-89DF-7703407434D4}" type="datetimeFigureOut">
               <a:rPr lang="ru-RU" smtClean="0"/>
-              <a:t>09.05.2021</a:t>
+              <a:t>10.05.2021</a:t>
             </a:fld>
             <a:endParaRPr lang="ru-RU"/>
           </a:p>
@@ -2098,7 +2092,7 @@
           <a:p>
             <a:fld id="{617D1E1C-FC9C-4CA1-89DF-7703407434D4}" type="datetimeFigureOut">
               <a:rPr lang="ru-RU" smtClean="0"/>
-              <a:t>09.05.2021</a:t>
+              <a:t>10.05.2021</a:t>
             </a:fld>
             <a:endParaRPr lang="ru-RU"/>
           </a:p>
@@ -2411,7 +2405,7 @@
           <a:p>
             <a:fld id="{617D1E1C-FC9C-4CA1-89DF-7703407434D4}" type="datetimeFigureOut">
               <a:rPr lang="ru-RU" smtClean="0"/>
-              <a:t>09.05.2021</a:t>
+              <a:t>10.05.2021</a:t>
             </a:fld>
             <a:endParaRPr lang="ru-RU"/>
           </a:p>
@@ -2700,7 +2694,7 @@
           <a:p>
             <a:fld id="{617D1E1C-FC9C-4CA1-89DF-7703407434D4}" type="datetimeFigureOut">
               <a:rPr lang="ru-RU" smtClean="0"/>
-              <a:t>09.05.2021</a:t>
+              <a:t>10.05.2021</a:t>
             </a:fld>
             <a:endParaRPr lang="ru-RU"/>
           </a:p>
@@ -2943,7 +2937,7 @@
           <a:p>
             <a:fld id="{617D1E1C-FC9C-4CA1-89DF-7703407434D4}" type="datetimeFigureOut">
               <a:rPr lang="ru-RU" smtClean="0"/>
-              <a:t>09.05.2021</a:t>
+              <a:t>10.05.2021</a:t>
             </a:fld>
             <a:endParaRPr lang="ru-RU"/>
           </a:p>
@@ -3464,11 +3458,11 @@
               <a:rPr lang="fr-FR" sz="5000" b="1" dirty="0">
                 <a:solidFill>
                   <a:schemeClr val="bg1">
-                    <a:lumMod val="95000"/>
+                    <a:lumMod val="75000"/>
                   </a:schemeClr>
                 </a:solidFill>
                 <a:highlight>
-                  <a:srgbClr val="0000FF"/>
+                  <a:srgbClr val="000080"/>
                 </a:highlight>
                 <a:latin typeface="Bahnschrift Condensed" panose="020B0502040204020203" pitchFamily="34" charset="0"/>
               </a:rPr>
@@ -3478,12 +3472,12 @@
               <a:rPr lang="fr-FR" sz="5000" b="1" i="0" dirty="0">
                 <a:solidFill>
                   <a:schemeClr val="bg1">
-                    <a:lumMod val="95000"/>
+                    <a:lumMod val="75000"/>
                   </a:schemeClr>
                 </a:solidFill>
                 <a:effectLst/>
                 <a:highlight>
-                  <a:srgbClr val="0000FF"/>
+                  <a:srgbClr val="000080"/>
                 </a:highlight>
                 <a:latin typeface="Bahnschrift Condensed" panose="020B0502040204020203" pitchFamily="34" charset="0"/>
               </a:rPr>
@@ -3521,7 +3515,12 @@
             <p:ph type="subTitle" idx="1"/>
           </p:nvPr>
         </p:nvSpPr>
-        <p:spPr/>
+        <p:spPr>
+          <a:xfrm>
+            <a:off x="847288" y="3602037"/>
+            <a:ext cx="9820712" cy="2488369"/>
+          </a:xfrm>
+        </p:spPr>
         <p:txBody>
           <a:bodyPr>
             <a:normAutofit/>
@@ -3537,29 +3536,37 @@
           </a:p>
           <a:p>
             <a:pPr algn="l"/>
-            <a:r>
-              <a:rPr lang="fr-FR" sz="2800" dirty="0">
+            <a:endParaRPr lang="fr-FR" dirty="0">
+              <a:solidFill>
+                <a:srgbClr val="FF6600"/>
+              </a:solidFill>
+              <a:latin typeface="Colonna MT" panose="04020805060202030203" pitchFamily="82" charset="0"/>
+            </a:endParaRPr>
+          </a:p>
+          <a:p>
+            <a:pPr algn="l"/>
+            <a:r>
+              <a:rPr lang="fr-FR" dirty="0">
                 <a:solidFill>
-                  <a:schemeClr val="accent2">
-                    <a:lumMod val="75000"/>
-                  </a:schemeClr>
+                  <a:srgbClr val="FF6600"/>
                 </a:solidFill>
-                <a:highlight>
-                  <a:srgbClr val="000080"/>
-                </a:highlight>
+                <a:latin typeface="Colonna MT" panose="04020805060202030203" pitchFamily="82" charset="0"/>
+              </a:rPr>
+              <a:t>	  </a:t>
+            </a:r>
+            <a:r>
+              <a:rPr lang="fr-FR" b="1" dirty="0">
+                <a:solidFill>
+                  <a:srgbClr val="FF6600"/>
+                </a:solidFill>
                 <a:latin typeface="Colonna MT" panose="04020805060202030203" pitchFamily="82" charset="0"/>
               </a:rPr>
               <a:t>MIROCHNYK Sergiy</a:t>
             </a:r>
-            <a:endParaRPr lang="ru-RU" sz="2800" dirty="0">
+            <a:endParaRPr lang="ru-RU" b="1" dirty="0">
               <a:solidFill>
-                <a:schemeClr val="accent2">
-                  <a:lumMod val="75000"/>
-                </a:schemeClr>
+                <a:srgbClr val="FF6600"/>
               </a:solidFill>
-              <a:highlight>
-                <a:srgbClr val="000080"/>
-              </a:highlight>
             </a:endParaRPr>
           </a:p>
         </p:txBody>
@@ -3592,8 +3599,8 @@
         </p:blipFill>
         <p:spPr>
           <a:xfrm>
-            <a:off x="10125273" y="35654"/>
-            <a:ext cx="1901512" cy="1172361"/>
+            <a:off x="10667999" y="35654"/>
+            <a:ext cx="1358785" cy="837747"/>
           </a:xfrm>
           <a:prstGeom prst="rect">
             <a:avLst/>
@@ -3604,499 +3611,6 @@
     <p:extLst>
       <p:ext uri="{BB962C8B-B14F-4D97-AF65-F5344CB8AC3E}">
         <p14:creationId xmlns:p14="http://schemas.microsoft.com/office/powerpoint/2010/main" val="174530567"/>
-      </p:ext>
-    </p:extLst>
-  </p:cSld>
-  <p:clrMapOvr>
-    <a:masterClrMapping/>
-  </p:clrMapOvr>
-</p:sld>
-</file>
-
-<file path=ppt/slides/slide10.xml><?xml version="1.0" encoding="utf-8"?>
-<p:sld xmlns:a="http://schemas.openxmlformats.org/drawingml/2006/main" xmlns:r="http://schemas.openxmlformats.org/officeDocument/2006/relationships" xmlns:p="http://schemas.openxmlformats.org/presentationml/2006/main">
-  <p:cSld>
-    <p:spTree>
-      <p:nvGrpSpPr>
-        <p:cNvPr id="1" name=""/>
-        <p:cNvGrpSpPr/>
-        <p:nvPr/>
-      </p:nvGrpSpPr>
-      <p:grpSpPr>
-        <a:xfrm>
-          <a:off x="0" y="0"/>
-          <a:ext cx="0" cy="0"/>
-          <a:chOff x="0" y="0"/>
-          <a:chExt cx="0" cy="0"/>
-        </a:xfrm>
-      </p:grpSpPr>
-      <p:sp>
-        <p:nvSpPr>
-          <p:cNvPr id="2" name="Title 1">
-            <a:extLst>
-              <a:ext uri="{FF2B5EF4-FFF2-40B4-BE49-F238E27FC236}">
-                <a16:creationId xmlns:a16="http://schemas.microsoft.com/office/drawing/2014/main" id="{F49B3595-1527-428D-9FC0-AFFF02A05D97}"/>
-              </a:ext>
-            </a:extLst>
-          </p:cNvPr>
-          <p:cNvSpPr>
-            <a:spLocks noGrp="1"/>
-          </p:cNvSpPr>
-          <p:nvPr>
-            <p:ph type="title"/>
-          </p:nvPr>
-        </p:nvSpPr>
-        <p:spPr>
-          <a:xfrm>
-            <a:off x="1188720" y="81280"/>
-            <a:ext cx="10165080" cy="762000"/>
-          </a:xfrm>
-        </p:spPr>
-        <p:txBody>
-          <a:bodyPr>
-            <a:normAutofit/>
-          </a:bodyPr>
-          <a:lstStyle/>
-          <a:p>
-            <a:r>
-              <a:rPr lang="fr-FR" sz="1500" dirty="0"/>
-              <a:t>Les </a:t>
-            </a:r>
-            <a:r>
-              <a:rPr lang="fr-FR" sz="1500" dirty="0" err="1"/>
-              <a:t>cards</a:t>
-            </a:r>
-            <a:r>
-              <a:rPr lang="fr-FR" sz="1500" dirty="0"/>
-              <a:t> «d’Activités» ont été fait de la même manière  (HTML)</a:t>
-            </a:r>
-            <a:endParaRPr lang="ru-RU" sz="1500" dirty="0"/>
-          </a:p>
-        </p:txBody>
-      </p:sp>
-      <p:pic>
-        <p:nvPicPr>
-          <p:cNvPr id="15" name="Content Placeholder 14">
-            <a:extLst>
-              <a:ext uri="{FF2B5EF4-FFF2-40B4-BE49-F238E27FC236}">
-                <a16:creationId xmlns:a16="http://schemas.microsoft.com/office/drawing/2014/main" id="{510254A0-9771-4456-A124-1972660E9FAD}"/>
-              </a:ext>
-            </a:extLst>
-          </p:cNvPr>
-          <p:cNvPicPr>
-            <a:picLocks noGrp="1" noChangeAspect="1"/>
-          </p:cNvPicPr>
-          <p:nvPr>
-            <p:ph idx="1"/>
-          </p:nvPr>
-        </p:nvPicPr>
-        <p:blipFill>
-          <a:blip r:embed="rId2">
-            <a:extLst>
-              <a:ext uri="{28A0092B-C50C-407E-A947-70E740481C1C}">
-                <a14:useLocalDpi xmlns:a14="http://schemas.microsoft.com/office/drawing/2010/main" val="0"/>
-              </a:ext>
-            </a:extLst>
-          </a:blip>
-          <a:stretch>
-            <a:fillRect/>
-          </a:stretch>
-        </p:blipFill>
-        <p:spPr>
-          <a:xfrm>
-            <a:off x="1188720" y="670560"/>
-            <a:ext cx="9997440" cy="5852160"/>
-          </a:xfrm>
-        </p:spPr>
-      </p:pic>
-    </p:spTree>
-    <p:extLst>
-      <p:ext uri="{BB962C8B-B14F-4D97-AF65-F5344CB8AC3E}">
-        <p14:creationId xmlns:p14="http://schemas.microsoft.com/office/powerpoint/2010/main" val="3992671464"/>
-      </p:ext>
-    </p:extLst>
-  </p:cSld>
-  <p:clrMapOvr>
-    <a:masterClrMapping/>
-  </p:clrMapOvr>
-</p:sld>
-</file>
-
-<file path=ppt/slides/slide11.xml><?xml version="1.0" encoding="utf-8"?>
-<p:sld xmlns:a="http://schemas.openxmlformats.org/drawingml/2006/main" xmlns:r="http://schemas.openxmlformats.org/officeDocument/2006/relationships" xmlns:p="http://schemas.openxmlformats.org/presentationml/2006/main">
-  <p:cSld>
-    <p:spTree>
-      <p:nvGrpSpPr>
-        <p:cNvPr id="1" name=""/>
-        <p:cNvGrpSpPr/>
-        <p:nvPr/>
-      </p:nvGrpSpPr>
-      <p:grpSpPr>
-        <a:xfrm>
-          <a:off x="0" y="0"/>
-          <a:ext cx="0" cy="0"/>
-          <a:chOff x="0" y="0"/>
-          <a:chExt cx="0" cy="0"/>
-        </a:xfrm>
-      </p:grpSpPr>
-      <p:sp>
-        <p:nvSpPr>
-          <p:cNvPr id="2" name="Title 1">
-            <a:extLst>
-              <a:ext uri="{FF2B5EF4-FFF2-40B4-BE49-F238E27FC236}">
-                <a16:creationId xmlns:a16="http://schemas.microsoft.com/office/drawing/2014/main" id="{F49B3595-1527-428D-9FC0-AFFF02A05D97}"/>
-              </a:ext>
-            </a:extLst>
-          </p:cNvPr>
-          <p:cNvSpPr>
-            <a:spLocks noGrp="1"/>
-          </p:cNvSpPr>
-          <p:nvPr>
-            <p:ph type="title"/>
-          </p:nvPr>
-        </p:nvSpPr>
-        <p:spPr>
-          <a:xfrm>
-            <a:off x="1051560" y="81280"/>
-            <a:ext cx="10302240" cy="762000"/>
-          </a:xfrm>
-        </p:spPr>
-        <p:txBody>
-          <a:bodyPr>
-            <a:normAutofit/>
-          </a:bodyPr>
-          <a:lstStyle/>
-          <a:p>
-            <a:r>
-              <a:rPr lang="fr-FR" sz="1500" dirty="0"/>
-              <a:t>Les </a:t>
-            </a:r>
-            <a:r>
-              <a:rPr lang="fr-FR" sz="1500" dirty="0" err="1"/>
-              <a:t>cards</a:t>
-            </a:r>
-            <a:r>
-              <a:rPr lang="fr-FR" sz="1500" dirty="0"/>
-              <a:t> «d’Activités» ont été fait de la même manière, en plus pour ces </a:t>
-            </a:r>
-            <a:r>
-              <a:rPr lang="fr-FR" sz="1500" dirty="0" err="1"/>
-              <a:t>cards</a:t>
-            </a:r>
-            <a:r>
-              <a:rPr lang="fr-FR" sz="1500" dirty="0"/>
-              <a:t> j’ai configuré la «responsive» pour tous les types d’écrans.</a:t>
-            </a:r>
-            <a:endParaRPr lang="ru-RU" sz="1500" dirty="0"/>
-          </a:p>
-        </p:txBody>
-      </p:sp>
-      <p:pic>
-        <p:nvPicPr>
-          <p:cNvPr id="6" name="Content Placeholder 5">
-            <a:extLst>
-              <a:ext uri="{FF2B5EF4-FFF2-40B4-BE49-F238E27FC236}">
-                <a16:creationId xmlns:a16="http://schemas.microsoft.com/office/drawing/2014/main" id="{6B7C74D7-6BD4-45B0-ABA1-0333D59A1E39}"/>
-              </a:ext>
-            </a:extLst>
-          </p:cNvPr>
-          <p:cNvPicPr>
-            <a:picLocks noGrp="1" noChangeAspect="1"/>
-          </p:cNvPicPr>
-          <p:nvPr>
-            <p:ph idx="1"/>
-          </p:nvPr>
-        </p:nvPicPr>
-        <p:blipFill>
-          <a:blip r:embed="rId2">
-            <a:extLst>
-              <a:ext uri="{28A0092B-C50C-407E-A947-70E740481C1C}">
-                <a14:useLocalDpi xmlns:a14="http://schemas.microsoft.com/office/drawing/2010/main" val="0"/>
-              </a:ext>
-            </a:extLst>
-          </a:blip>
-          <a:stretch>
-            <a:fillRect/>
-          </a:stretch>
-        </p:blipFill>
-        <p:spPr>
-          <a:xfrm>
-            <a:off x="1148080" y="701040"/>
-            <a:ext cx="9682480" cy="5781040"/>
-          </a:xfrm>
-        </p:spPr>
-      </p:pic>
-    </p:spTree>
-    <p:extLst>
-      <p:ext uri="{BB962C8B-B14F-4D97-AF65-F5344CB8AC3E}">
-        <p14:creationId xmlns:p14="http://schemas.microsoft.com/office/powerpoint/2010/main" val="185371283"/>
-      </p:ext>
-    </p:extLst>
-  </p:cSld>
-  <p:clrMapOvr>
-    <a:masterClrMapping/>
-  </p:clrMapOvr>
-</p:sld>
-</file>
-
-<file path=ppt/slides/slide12.xml><?xml version="1.0" encoding="utf-8"?>
-<p:sld xmlns:a="http://schemas.openxmlformats.org/drawingml/2006/main" xmlns:r="http://schemas.openxmlformats.org/officeDocument/2006/relationships" xmlns:p="http://schemas.openxmlformats.org/presentationml/2006/main">
-  <p:cSld>
-    <p:spTree>
-      <p:nvGrpSpPr>
-        <p:cNvPr id="1" name=""/>
-        <p:cNvGrpSpPr/>
-        <p:nvPr/>
-      </p:nvGrpSpPr>
-      <p:grpSpPr>
-        <a:xfrm>
-          <a:off x="0" y="0"/>
-          <a:ext cx="0" cy="0"/>
-          <a:chOff x="0" y="0"/>
-          <a:chExt cx="0" cy="0"/>
-        </a:xfrm>
-      </p:grpSpPr>
-      <p:sp>
-        <p:nvSpPr>
-          <p:cNvPr id="2" name="Title 1">
-            <a:extLst>
-              <a:ext uri="{FF2B5EF4-FFF2-40B4-BE49-F238E27FC236}">
-                <a16:creationId xmlns:a16="http://schemas.microsoft.com/office/drawing/2014/main" id="{F49B3595-1527-428D-9FC0-AFFF02A05D97}"/>
-              </a:ext>
-            </a:extLst>
-          </p:cNvPr>
-          <p:cNvSpPr>
-            <a:spLocks noGrp="1"/>
-          </p:cNvSpPr>
-          <p:nvPr>
-            <p:ph type="title"/>
-          </p:nvPr>
-        </p:nvSpPr>
-        <p:spPr>
-          <a:xfrm>
-            <a:off x="1188720" y="81280"/>
-            <a:ext cx="10165080" cy="762000"/>
-          </a:xfrm>
-        </p:spPr>
-        <p:txBody>
-          <a:bodyPr>
-            <a:normAutofit/>
-          </a:bodyPr>
-          <a:lstStyle/>
-          <a:p>
-            <a:r>
-              <a:rPr lang="fr-FR" sz="1500" dirty="0"/>
-              <a:t>Pour finir, le «FOOTER» de notre site (HTML)</a:t>
-            </a:r>
-            <a:endParaRPr lang="ru-RU" sz="1500" dirty="0"/>
-          </a:p>
-        </p:txBody>
-      </p:sp>
-      <p:pic>
-        <p:nvPicPr>
-          <p:cNvPr id="6" name="Content Placeholder 5">
-            <a:extLst>
-              <a:ext uri="{FF2B5EF4-FFF2-40B4-BE49-F238E27FC236}">
-                <a16:creationId xmlns:a16="http://schemas.microsoft.com/office/drawing/2014/main" id="{C5D3BCFA-9141-4498-B70F-219A922EE30F}"/>
-              </a:ext>
-            </a:extLst>
-          </p:cNvPr>
-          <p:cNvPicPr>
-            <a:picLocks noGrp="1" noChangeAspect="1"/>
-          </p:cNvPicPr>
-          <p:nvPr>
-            <p:ph idx="1"/>
-          </p:nvPr>
-        </p:nvPicPr>
-        <p:blipFill>
-          <a:blip r:embed="rId2">
-            <a:extLst>
-              <a:ext uri="{28A0092B-C50C-407E-A947-70E740481C1C}">
-                <a14:useLocalDpi xmlns:a14="http://schemas.microsoft.com/office/drawing/2010/main" val="0"/>
-              </a:ext>
-            </a:extLst>
-          </a:blip>
-          <a:stretch>
-            <a:fillRect/>
-          </a:stretch>
-        </p:blipFill>
-        <p:spPr>
-          <a:xfrm>
-            <a:off x="1188720" y="741680"/>
-            <a:ext cx="9438639" cy="5588000"/>
-          </a:xfrm>
-        </p:spPr>
-      </p:pic>
-    </p:spTree>
-    <p:extLst>
-      <p:ext uri="{BB962C8B-B14F-4D97-AF65-F5344CB8AC3E}">
-        <p14:creationId xmlns:p14="http://schemas.microsoft.com/office/powerpoint/2010/main" val="3713185438"/>
-      </p:ext>
-    </p:extLst>
-  </p:cSld>
-  <p:clrMapOvr>
-    <a:masterClrMapping/>
-  </p:clrMapOvr>
-</p:sld>
-</file>
-
-<file path=ppt/slides/slide13.xml><?xml version="1.0" encoding="utf-8"?>
-<p:sld xmlns:a="http://schemas.openxmlformats.org/drawingml/2006/main" xmlns:r="http://schemas.openxmlformats.org/officeDocument/2006/relationships" xmlns:p="http://schemas.openxmlformats.org/presentationml/2006/main">
-  <p:cSld>
-    <p:spTree>
-      <p:nvGrpSpPr>
-        <p:cNvPr id="1" name=""/>
-        <p:cNvGrpSpPr/>
-        <p:nvPr/>
-      </p:nvGrpSpPr>
-      <p:grpSpPr>
-        <a:xfrm>
-          <a:off x="0" y="0"/>
-          <a:ext cx="0" cy="0"/>
-          <a:chOff x="0" y="0"/>
-          <a:chExt cx="0" cy="0"/>
-        </a:xfrm>
-      </p:grpSpPr>
-      <p:sp>
-        <p:nvSpPr>
-          <p:cNvPr id="2" name="Title 1">
-            <a:extLst>
-              <a:ext uri="{FF2B5EF4-FFF2-40B4-BE49-F238E27FC236}">
-                <a16:creationId xmlns:a16="http://schemas.microsoft.com/office/drawing/2014/main" id="{F49B3595-1527-428D-9FC0-AFFF02A05D97}"/>
-              </a:ext>
-            </a:extLst>
-          </p:cNvPr>
-          <p:cNvSpPr>
-            <a:spLocks noGrp="1"/>
-          </p:cNvSpPr>
-          <p:nvPr>
-            <p:ph type="title"/>
-          </p:nvPr>
-        </p:nvSpPr>
-        <p:spPr>
-          <a:xfrm>
-            <a:off x="1148080" y="81280"/>
-            <a:ext cx="10205720" cy="762000"/>
-          </a:xfrm>
-        </p:spPr>
-        <p:txBody>
-          <a:bodyPr>
-            <a:normAutofit/>
-          </a:bodyPr>
-          <a:lstStyle/>
-          <a:p>
-            <a:r>
-              <a:rPr lang="fr-FR" sz="1500" dirty="0"/>
-              <a:t>CSS pour le «FOOTER» de notre site, également la «responsive» mise en place  pour tous les types d’écrans.</a:t>
-            </a:r>
-            <a:endParaRPr lang="ru-RU" sz="1500" dirty="0"/>
-          </a:p>
-        </p:txBody>
-      </p:sp>
-      <p:pic>
-        <p:nvPicPr>
-          <p:cNvPr id="6" name="Content Placeholder 5">
-            <a:extLst>
-              <a:ext uri="{FF2B5EF4-FFF2-40B4-BE49-F238E27FC236}">
-                <a16:creationId xmlns:a16="http://schemas.microsoft.com/office/drawing/2014/main" id="{6B7C74D7-6BD4-45B0-ABA1-0333D59A1E39}"/>
-              </a:ext>
-            </a:extLst>
-          </p:cNvPr>
-          <p:cNvPicPr>
-            <a:picLocks noGrp="1" noChangeAspect="1"/>
-          </p:cNvPicPr>
-          <p:nvPr>
-            <p:ph idx="1"/>
-          </p:nvPr>
-        </p:nvPicPr>
-        <p:blipFill>
-          <a:blip r:embed="rId2">
-            <a:extLst>
-              <a:ext uri="{28A0092B-C50C-407E-A947-70E740481C1C}">
-                <a14:useLocalDpi xmlns:a14="http://schemas.microsoft.com/office/drawing/2010/main" val="0"/>
-              </a:ext>
-            </a:extLst>
-          </a:blip>
-          <a:stretch>
-            <a:fillRect/>
-          </a:stretch>
-        </p:blipFill>
-        <p:spPr>
-          <a:xfrm>
-            <a:off x="1148080" y="701040"/>
-            <a:ext cx="9682480" cy="5781040"/>
-          </a:xfrm>
-        </p:spPr>
-      </p:pic>
-    </p:spTree>
-    <p:extLst>
-      <p:ext uri="{BB962C8B-B14F-4D97-AF65-F5344CB8AC3E}">
-        <p14:creationId xmlns:p14="http://schemas.microsoft.com/office/powerpoint/2010/main" val="1930937302"/>
-      </p:ext>
-    </p:extLst>
-  </p:cSld>
-  <p:clrMapOvr>
-    <a:masterClrMapping/>
-  </p:clrMapOvr>
-</p:sld>
-</file>
-
-<file path=ppt/slides/slide14.xml><?xml version="1.0" encoding="utf-8"?>
-<p:sld xmlns:a="http://schemas.openxmlformats.org/drawingml/2006/main" xmlns:r="http://schemas.openxmlformats.org/officeDocument/2006/relationships" xmlns:p="http://schemas.openxmlformats.org/presentationml/2006/main">
-  <p:cSld>
-    <p:spTree>
-      <p:nvGrpSpPr>
-        <p:cNvPr id="1" name=""/>
-        <p:cNvGrpSpPr/>
-        <p:nvPr/>
-      </p:nvGrpSpPr>
-      <p:grpSpPr>
-        <a:xfrm>
-          <a:off x="0" y="0"/>
-          <a:ext cx="0" cy="0"/>
-          <a:chOff x="0" y="0"/>
-          <a:chExt cx="0" cy="0"/>
-        </a:xfrm>
-      </p:grpSpPr>
-      <p:pic>
-        <p:nvPicPr>
-          <p:cNvPr id="7" name="Content Placeholder 6">
-            <a:extLst>
-              <a:ext uri="{FF2B5EF4-FFF2-40B4-BE49-F238E27FC236}">
-                <a16:creationId xmlns:a16="http://schemas.microsoft.com/office/drawing/2014/main" id="{8F0DF227-8488-4641-A255-53962A9D5CEC}"/>
-              </a:ext>
-            </a:extLst>
-          </p:cNvPr>
-          <p:cNvPicPr>
-            <a:picLocks noGrp="1" noChangeAspect="1"/>
-          </p:cNvPicPr>
-          <p:nvPr>
-            <p:ph idx="1"/>
-          </p:nvPr>
-        </p:nvPicPr>
-        <p:blipFill>
-          <a:blip r:embed="rId2">
-            <a:extLst>
-              <a:ext uri="{28A0092B-C50C-407E-A947-70E740481C1C}">
-                <a14:useLocalDpi xmlns:a14="http://schemas.microsoft.com/office/drawing/2010/main" val="0"/>
-              </a:ext>
-            </a:extLst>
-          </a:blip>
-          <a:stretch>
-            <a:fillRect/>
-          </a:stretch>
-        </p:blipFill>
-        <p:spPr>
-          <a:xfrm>
-            <a:off x="3822481" y="946148"/>
-            <a:ext cx="4547037" cy="4965704"/>
-          </a:xfrm>
-        </p:spPr>
-      </p:pic>
-    </p:spTree>
-    <p:extLst>
-      <p:ext uri="{BB962C8B-B14F-4D97-AF65-F5344CB8AC3E}">
-        <p14:creationId xmlns:p14="http://schemas.microsoft.com/office/powerpoint/2010/main" val="2057897185"/>
       </p:ext>
     </p:extLst>
   </p:cSld>
@@ -4141,8 +3655,8 @@
         </p:nvSpPr>
         <p:spPr>
           <a:xfrm>
-            <a:off x="947956" y="528320"/>
-            <a:ext cx="9705843" cy="612584"/>
+            <a:off x="947956" y="159391"/>
+            <a:ext cx="10142290" cy="981513"/>
           </a:xfrm>
         </p:spPr>
         <p:txBody>
@@ -4152,27 +3666,72 @@
           <a:lstStyle/>
           <a:p>
             <a:r>
-              <a:rPr lang="fr-FR" sz="1500" dirty="0"/>
-              <a:t>Dans header j’ai utilisé la balise &lt;</a:t>
-            </a:r>
-            <a:r>
-              <a:rPr lang="fr-FR" sz="1500" dirty="0" err="1"/>
-              <a:t>nav</a:t>
-            </a:r>
-            <a:r>
-              <a:rPr lang="fr-FR" sz="1500" dirty="0"/>
-              <a:t>&gt;, comme navigation, pour créer mes 3 boutons liens (hébergement, activités, s’inscrire) (HTML)</a:t>
-            </a:r>
-            <a:endParaRPr lang="ru-RU" sz="1500" dirty="0"/>
+              <a:rPr lang="fr-FR" sz="1400" b="1" dirty="0">
+                <a:highlight>
+                  <a:srgbClr val="FF6600"/>
+                </a:highlight>
+                <a:latin typeface="Arial" panose="020B0604020202020204" pitchFamily="34" charset="0"/>
+                <a:cs typeface="Arial" panose="020B0604020202020204" pitchFamily="34" charset="0"/>
+              </a:rPr>
+              <a:t>GIT</a:t>
+            </a:r>
+            <a:r>
+              <a:rPr lang="ru-RU" sz="1400" dirty="0">
+                <a:latin typeface="Arial" panose="020B0604020202020204" pitchFamily="34" charset="0"/>
+                <a:cs typeface="Arial" panose="020B0604020202020204" pitchFamily="34" charset="0"/>
+              </a:rPr>
+              <a:t>:  </a:t>
+            </a:r>
+            <a:r>
+              <a:rPr lang="fr-FR" sz="1400" dirty="0">
+                <a:latin typeface="Arial" panose="020B0604020202020204" pitchFamily="34" charset="0"/>
+                <a:cs typeface="Arial" panose="020B0604020202020204" pitchFamily="34" charset="0"/>
+              </a:rPr>
+              <a:t>je l’ai * téléchargé de son site officiel, puis l’installation sur PC ; </a:t>
+            </a:r>
+            <a:br>
+              <a:rPr lang="fr-FR" sz="1400" dirty="0">
+                <a:latin typeface="Arial" panose="020B0604020202020204" pitchFamily="34" charset="0"/>
+                <a:cs typeface="Arial" panose="020B0604020202020204" pitchFamily="34" charset="0"/>
+              </a:rPr>
+            </a:br>
+            <a:r>
+              <a:rPr lang="fr-FR" sz="1400" dirty="0">
+                <a:latin typeface="Arial" panose="020B0604020202020204" pitchFamily="34" charset="0"/>
+                <a:cs typeface="Arial" panose="020B0604020202020204" pitchFamily="34" charset="0"/>
+              </a:rPr>
+              <a:t>                  * la création de compte sur GitHub avec Repository nommé </a:t>
+            </a:r>
+            <a:r>
+              <a:rPr lang="fr-FR" sz="1400" i="1" dirty="0">
+                <a:latin typeface="Arial" panose="020B0604020202020204" pitchFamily="34" charset="0"/>
+                <a:cs typeface="Arial" panose="020B0604020202020204" pitchFamily="34" charset="0"/>
+              </a:rPr>
+              <a:t>/SergiyMirochnyk_2_30032021 pour P2</a:t>
+            </a:r>
+            <a:br>
+              <a:rPr lang="fr-FR" sz="1500" dirty="0">
+                <a:latin typeface="Bahnschrift SemiLight" panose="020B0502040204020203" pitchFamily="34" charset="0"/>
+              </a:rPr>
+            </a:br>
+            <a:r>
+              <a:rPr lang="fr-FR" sz="1500" dirty="0">
+                <a:latin typeface="Bahnschrift SemiLight" panose="020B0502040204020203" pitchFamily="34" charset="0"/>
+              </a:rPr>
+              <a:t>        </a:t>
+            </a:r>
+            <a:endParaRPr lang="ru-RU" sz="1500" dirty="0">
+              <a:latin typeface="Bahnschrift SemiLight" panose="020B0502040204020203" pitchFamily="34" charset="0"/>
+            </a:endParaRPr>
           </a:p>
         </p:txBody>
       </p:sp>
       <p:pic>
         <p:nvPicPr>
-          <p:cNvPr id="5" name="Content Placeholder 4">
-            <a:extLst>
-              <a:ext uri="{FF2B5EF4-FFF2-40B4-BE49-F238E27FC236}">
-                <a16:creationId xmlns:a16="http://schemas.microsoft.com/office/drawing/2014/main" id="{E98F9CDB-D9C0-4438-8881-4EA702C90C1D}"/>
+          <p:cNvPr id="7" name="Content Placeholder 6">
+            <a:extLst>
+              <a:ext uri="{FF2B5EF4-FFF2-40B4-BE49-F238E27FC236}">
+                <a16:creationId xmlns:a16="http://schemas.microsoft.com/office/drawing/2014/main" id="{94FB16BC-11E2-42B4-AA28-8BF5F36593AA}"/>
               </a:ext>
             </a:extLst>
           </p:cNvPr>
@@ -4197,8 +3756,8 @@
         </p:blipFill>
         <p:spPr>
           <a:xfrm>
-            <a:off x="947956" y="1325563"/>
-            <a:ext cx="9705843" cy="4851400"/>
+            <a:off x="1468074" y="880845"/>
+            <a:ext cx="8187654" cy="5721291"/>
           </a:xfrm>
         </p:spPr>
       </p:pic>
@@ -4250,8 +3809,8 @@
         </p:nvSpPr>
         <p:spPr>
           <a:xfrm>
-            <a:off x="1290320" y="101600"/>
-            <a:ext cx="10063480" cy="518160"/>
+            <a:off x="671119" y="159391"/>
+            <a:ext cx="9539681" cy="981513"/>
           </a:xfrm>
         </p:spPr>
         <p:txBody>
@@ -4261,19 +3820,65 @@
           <a:lstStyle/>
           <a:p>
             <a:r>
-              <a:rPr lang="fr-FR" sz="1600" dirty="0"/>
-              <a:t>CSS pour donner du style à notre HEADER</a:t>
-            </a:r>
-            <a:endParaRPr lang="ru-RU" sz="1500" dirty="0"/>
+              <a:rPr lang="fr-FR" sz="1400" b="1" dirty="0">
+                <a:highlight>
+                  <a:srgbClr val="FF6600"/>
+                </a:highlight>
+                <a:latin typeface="Consolas" panose="020B0609020204030204" pitchFamily="49" charset="0"/>
+                <a:cs typeface="Arial" panose="020B0604020202020204" pitchFamily="34" charset="0"/>
+              </a:rPr>
+              <a:t>VISUAL STUDIO: </a:t>
+            </a:r>
+            <a:r>
+              <a:rPr lang="fr-FR" sz="1400" dirty="0">
+                <a:latin typeface="Consolas" panose="020B0609020204030204" pitchFamily="49" charset="0"/>
+                <a:cs typeface="Arial" panose="020B0604020202020204" pitchFamily="34" charset="0"/>
+              </a:rPr>
+              <a:t>* l’installation Visual Studio et ses plugins </a:t>
+            </a:r>
+            <a:br>
+              <a:rPr lang="fr-FR" sz="1400" dirty="0">
+                <a:latin typeface="Consolas" panose="020B0609020204030204" pitchFamily="49" charset="0"/>
+                <a:cs typeface="Arial" panose="020B0604020202020204" pitchFamily="34" charset="0"/>
+              </a:rPr>
+            </a:br>
+            <a:r>
+              <a:rPr lang="fr-FR" sz="1400" dirty="0">
+                <a:latin typeface="Consolas" panose="020B0609020204030204" pitchFamily="49" charset="0"/>
+                <a:cs typeface="Arial" panose="020B0604020202020204" pitchFamily="34" charset="0"/>
+              </a:rPr>
+              <a:t>	      * création des fichiers : </a:t>
+            </a:r>
+            <a:r>
+              <a:rPr lang="fr-FR" sz="1400" i="1" dirty="0">
+                <a:latin typeface="Consolas" panose="020B0609020204030204" pitchFamily="49" charset="0"/>
+                <a:cs typeface="Arial" panose="020B0604020202020204" pitchFamily="34" charset="0"/>
+              </a:rPr>
+              <a:t>index.html ; index.css </a:t>
+            </a:r>
+            <a:br>
+              <a:rPr lang="fr-FR" sz="1500" dirty="0">
+                <a:latin typeface="Consolas" panose="020B0609020204030204" pitchFamily="49" charset="0"/>
+              </a:rPr>
+            </a:br>
+            <a:r>
+              <a:rPr lang="fr-FR" sz="1500" dirty="0">
+                <a:latin typeface="Consolas" panose="020B0609020204030204" pitchFamily="49" charset="0"/>
+              </a:rPr>
+              <a:t>        </a:t>
+            </a:r>
+            <a:endParaRPr lang="ru-RU" sz="1500" dirty="0">
+              <a:latin typeface="Consolas" panose="020B0609020204030204" pitchFamily="49" charset="0"/>
+            </a:endParaRPr>
           </a:p>
         </p:txBody>
       </p:sp>
       <p:pic>
         <p:nvPicPr>
-          <p:cNvPr id="7" name="Content Placeholder 6">
-            <a:extLst>
-              <a:ext uri="{FF2B5EF4-FFF2-40B4-BE49-F238E27FC236}">
-                <a16:creationId xmlns:a16="http://schemas.microsoft.com/office/drawing/2014/main" id="{2802840D-E1BC-48E9-AE34-8E84DF5D4D3F}"/>
+          <p:cNvPr id="6" name="Content Placeholder 5">
+            <a:extLst>
+              <a:ext uri="{FF2B5EF4-FFF2-40B4-BE49-F238E27FC236}">
+                <a16:creationId xmlns:a16="http://schemas.microsoft.com/office/drawing/2014/main" id="{6C05E9D6-56B6-4DF0-BB5B-E5988FE22E8C}"/>
               </a:ext>
             </a:extLst>
           </p:cNvPr>
@@ -4298,15 +3903,15 @@
         </p:blipFill>
         <p:spPr>
           <a:xfrm>
-            <a:off x="1290320" y="619760"/>
-            <a:ext cx="9814560" cy="5902960"/>
+            <a:off x="2204721" y="910680"/>
+            <a:ext cx="7350340" cy="5787929"/>
           </a:xfrm>
         </p:spPr>
       </p:pic>
     </p:spTree>
     <p:extLst>
       <p:ext uri="{BB962C8B-B14F-4D97-AF65-F5344CB8AC3E}">
-        <p14:creationId xmlns:p14="http://schemas.microsoft.com/office/powerpoint/2010/main" val="3119459726"/>
+        <p14:creationId xmlns:p14="http://schemas.microsoft.com/office/powerpoint/2010/main" val="2627331890"/>
       </p:ext>
     </p:extLst>
   </p:cSld>
@@ -4351,8 +3956,8 @@
         </p:nvSpPr>
         <p:spPr>
           <a:xfrm>
-            <a:off x="838199" y="681037"/>
-            <a:ext cx="10515601" cy="726629"/>
+            <a:off x="1290320" y="101600"/>
+            <a:ext cx="10063480" cy="518160"/>
           </a:xfrm>
         </p:spPr>
         <p:txBody>
@@ -4361,22 +3966,6 @@
           </a:bodyPr>
           <a:lstStyle/>
           <a:p>
-            <a:r>
-              <a:rPr lang="fr-FR" sz="1500" dirty="0" err="1"/>
-              <a:t>Search_form</a:t>
-            </a:r>
-            <a:r>
-              <a:rPr lang="fr-FR" sz="1500" dirty="0"/>
-              <a:t> pour créer la forme de recherche sur notre site (+2 </a:t>
-            </a:r>
-            <a:r>
-              <a:rPr lang="fr-FR" sz="1500" dirty="0" err="1"/>
-              <a:t>icons</a:t>
-            </a:r>
-            <a:r>
-              <a:rPr lang="fr-FR" sz="1500" dirty="0"/>
-              <a:t>) (HTML)</a:t>
-            </a:r>
             <a:endParaRPr lang="ru-RU" sz="1500" dirty="0"/>
           </a:p>
         </p:txBody>
@@ -4386,7 +3975,7 @@
           <p:cNvPr id="7" name="Content Placeholder 6">
             <a:extLst>
               <a:ext uri="{FF2B5EF4-FFF2-40B4-BE49-F238E27FC236}">
-                <a16:creationId xmlns:a16="http://schemas.microsoft.com/office/drawing/2014/main" id="{3D05A1AE-B44E-4AB6-A024-19DA6CC9ED75}"/>
+                <a16:creationId xmlns:a16="http://schemas.microsoft.com/office/drawing/2014/main" id="{2802840D-E1BC-48E9-AE34-8E84DF5D4D3F}"/>
               </a:ext>
             </a:extLst>
           </p:cNvPr>
@@ -4411,15 +4000,15 @@
         </p:blipFill>
         <p:spPr>
           <a:xfrm>
-            <a:off x="838199" y="1407667"/>
-            <a:ext cx="10193323" cy="3332113"/>
+            <a:off x="1290320" y="274321"/>
+            <a:ext cx="9112029" cy="6289040"/>
           </a:xfrm>
         </p:spPr>
       </p:pic>
     </p:spTree>
     <p:extLst>
       <p:ext uri="{BB962C8B-B14F-4D97-AF65-F5344CB8AC3E}">
-        <p14:creationId xmlns:p14="http://schemas.microsoft.com/office/powerpoint/2010/main" val="3275559175"/>
+        <p14:creationId xmlns:p14="http://schemas.microsoft.com/office/powerpoint/2010/main" val="3119459726"/>
       </p:ext>
     </p:extLst>
   </p:cSld>
@@ -4464,8 +4053,8 @@
         </p:nvSpPr>
         <p:spPr>
           <a:xfrm>
-            <a:off x="1209038" y="101600"/>
-            <a:ext cx="10144761" cy="518160"/>
+            <a:off x="675639" y="132081"/>
+            <a:ext cx="11170921" cy="1194306"/>
           </a:xfrm>
         </p:spPr>
         <p:txBody>
@@ -4475,10 +4064,75 @@
           <a:lstStyle/>
           <a:p>
             <a:r>
-              <a:rPr lang="fr-FR" sz="1600" dirty="0"/>
-              <a:t>CSS pour donner du style à notre FORME DE RECHERCHE</a:t>
-            </a:r>
-            <a:endParaRPr lang="ru-RU" sz="1500" dirty="0"/>
+              <a:rPr lang="fr-FR" sz="1400" b="1" dirty="0">
+                <a:highlight>
+                  <a:srgbClr val="FF6600"/>
+                </a:highlight>
+                <a:latin typeface="Consolas" panose="020B0609020204030204" pitchFamily="49" charset="0"/>
+                <a:cs typeface="Arial" panose="020B0604020202020204" pitchFamily="34" charset="0"/>
+              </a:rPr>
+              <a:t>W3:</a:t>
+            </a:r>
+            <a:r>
+              <a:rPr lang="fr-FR" sz="1400" b="1" dirty="0">
+                <a:latin typeface="Consolas" panose="020B0609020204030204" pitchFamily="49" charset="0"/>
+                <a:cs typeface="Arial" panose="020B0604020202020204" pitchFamily="34" charset="0"/>
+              </a:rPr>
+              <a:t>  </a:t>
+            </a:r>
+            <a:r>
+              <a:rPr lang="fr-FR" sz="1400" dirty="0">
+                <a:latin typeface="Consolas" panose="020B0609020204030204" pitchFamily="49" charset="0"/>
+                <a:cs typeface="Arial" panose="020B0604020202020204" pitchFamily="34" charset="0"/>
+              </a:rPr>
+              <a:t>À la fin de création de code pour l’environnement Desktop, Mobile et </a:t>
+            </a:r>
+            <a:r>
+              <a:rPr lang="fr-FR" sz="1400" dirty="0" err="1">
+                <a:latin typeface="Consolas" panose="020B0609020204030204" pitchFamily="49" charset="0"/>
+                <a:cs typeface="Arial" panose="020B0604020202020204" pitchFamily="34" charset="0"/>
+              </a:rPr>
+              <a:t>Ipad</a:t>
+            </a:r>
+            <a:r>
+              <a:rPr lang="fr-FR" sz="1400" dirty="0">
+                <a:latin typeface="Consolas" panose="020B0609020204030204" pitchFamily="49" charset="0"/>
+                <a:cs typeface="Arial" panose="020B0604020202020204" pitchFamily="34" charset="0"/>
+              </a:rPr>
+              <a:t>, j’ai vérifié mon code HTML </a:t>
+            </a:r>
+            <a:br>
+              <a:rPr lang="fr-FR" sz="1400" dirty="0">
+                <a:latin typeface="Consolas" panose="020B0609020204030204" pitchFamily="49" charset="0"/>
+                <a:cs typeface="Arial" panose="020B0604020202020204" pitchFamily="34" charset="0"/>
+              </a:rPr>
+            </a:br>
+            <a:r>
+              <a:rPr lang="fr-FR" sz="1400" dirty="0">
+                <a:latin typeface="Consolas" panose="020B0609020204030204" pitchFamily="49" charset="0"/>
+                <a:cs typeface="Arial" panose="020B0604020202020204" pitchFamily="34" charset="0"/>
+              </a:rPr>
+              <a:t>     et CSS sur le site </a:t>
+            </a:r>
+            <a:r>
+              <a:rPr lang="fr-FR" sz="1400" i="1" dirty="0">
+                <a:latin typeface="Consolas" panose="020B0609020204030204" pitchFamily="49" charset="0"/>
+                <a:cs typeface="Arial" panose="020B0604020202020204" pitchFamily="34" charset="0"/>
+                <a:hlinkClick r:id="rId2"/>
+              </a:rPr>
+              <a:t>https://validator.w3.org/</a:t>
+            </a:r>
+            <a:r>
+              <a:rPr lang="fr-FR" sz="1400" i="1" dirty="0">
+                <a:latin typeface="Consolas" panose="020B0609020204030204" pitchFamily="49" charset="0"/>
+                <a:cs typeface="Arial" panose="020B0604020202020204" pitchFamily="34" charset="0"/>
+              </a:rPr>
+              <a:t> </a:t>
+            </a:r>
+            <a:endParaRPr lang="ru-RU" sz="1400" i="1" dirty="0">
+              <a:latin typeface="Consolas" panose="020B0609020204030204" pitchFamily="49" charset="0"/>
+              <a:cs typeface="Arial" panose="020B0604020202020204" pitchFamily="34" charset="0"/>
+            </a:endParaRPr>
           </a:p>
         </p:txBody>
       </p:sp>
@@ -4487,7 +4141,7 @@
           <p:cNvPr id="6" name="Content Placeholder 5">
             <a:extLst>
               <a:ext uri="{FF2B5EF4-FFF2-40B4-BE49-F238E27FC236}">
-                <a16:creationId xmlns:a16="http://schemas.microsoft.com/office/drawing/2014/main" id="{83F53C3A-62F0-4C83-92AF-F3523917C385}"/>
+                <a16:creationId xmlns:a16="http://schemas.microsoft.com/office/drawing/2014/main" id="{5D37B075-024D-4255-99FC-B50F15C77F21}"/>
               </a:ext>
             </a:extLst>
           </p:cNvPr>
@@ -4499,7 +4153,7 @@
           </p:nvPr>
         </p:nvPicPr>
         <p:blipFill>
-          <a:blip r:embed="rId2">
+          <a:blip r:embed="rId3">
             <a:extLst>
               <a:ext uri="{28A0092B-C50C-407E-A947-70E740481C1C}">
                 <a14:useLocalDpi xmlns:a14="http://schemas.microsoft.com/office/drawing/2010/main" val="0"/>
@@ -4512,15 +4166,15 @@
         </p:blipFill>
         <p:spPr>
           <a:xfrm>
-            <a:off x="1209039" y="690880"/>
-            <a:ext cx="9631681" cy="5791200"/>
+            <a:off x="1645921" y="1209040"/>
+            <a:ext cx="7455998" cy="5252720"/>
           </a:xfrm>
         </p:spPr>
       </p:pic>
     </p:spTree>
     <p:extLst>
       <p:ext uri="{BB962C8B-B14F-4D97-AF65-F5344CB8AC3E}">
-        <p14:creationId xmlns:p14="http://schemas.microsoft.com/office/powerpoint/2010/main" val="3954535009"/>
+        <p14:creationId xmlns:p14="http://schemas.microsoft.com/office/powerpoint/2010/main" val="3275559175"/>
       </p:ext>
     </p:extLst>
   </p:cSld>
@@ -4565,8 +4219,8 @@
         </p:nvSpPr>
         <p:spPr>
           <a:xfrm>
-            <a:off x="838200" y="81280"/>
-            <a:ext cx="10515600" cy="762000"/>
+            <a:off x="314960" y="285227"/>
+            <a:ext cx="11714480" cy="679508"/>
           </a:xfrm>
         </p:spPr>
         <p:txBody>
@@ -4576,27 +4230,82 @@
           <a:lstStyle/>
           <a:p>
             <a:r>
-              <a:rPr lang="fr-FR" sz="1500" dirty="0"/>
-              <a:t>Également les filtres ont été rajoutés. J’ai utilisé les balises  &lt;div&gt;, &lt;</a:t>
-            </a:r>
-            <a:r>
-              <a:rPr lang="fr-FR" sz="1500" dirty="0" err="1"/>
-              <a:t>span</a:t>
-            </a:r>
-            <a:r>
-              <a:rPr lang="fr-FR" sz="1500" dirty="0"/>
-              <a:t>&gt; dans la &lt;section&gt; (HTML)</a:t>
-            </a:r>
-            <a:endParaRPr lang="ru-RU" sz="1500" dirty="0"/>
+              <a:rPr lang="fr-FR" sz="1400" dirty="0">
+                <a:highlight>
+                  <a:srgbClr val="FF6600"/>
+                </a:highlight>
+                <a:latin typeface="Consolas" panose="020B0609020204030204" pitchFamily="49" charset="0"/>
+                <a:cs typeface="Arial" panose="020B0604020202020204" pitchFamily="34" charset="0"/>
+              </a:rPr>
+              <a:t>GIT PAGES:  </a:t>
+            </a:r>
+            <a:r>
+              <a:rPr lang="fr-FR" sz="1400" dirty="0">
+                <a:latin typeface="Consolas" panose="020B0609020204030204" pitchFamily="49" charset="0"/>
+                <a:cs typeface="Arial" panose="020B0604020202020204" pitchFamily="34" charset="0"/>
+              </a:rPr>
+              <a:t>* responsive vérification de versions </a:t>
+            </a:r>
+            <a:r>
+              <a:rPr lang="fr-FR" sz="1400" dirty="0" err="1">
+                <a:latin typeface="Consolas" panose="020B0609020204030204" pitchFamily="49" charset="0"/>
+                <a:cs typeface="Arial" panose="020B0604020202020204" pitchFamily="34" charset="0"/>
+              </a:rPr>
+              <a:t>Ipad</a:t>
+            </a:r>
+            <a:r>
+              <a:rPr lang="fr-FR" sz="1400" dirty="0">
+                <a:latin typeface="Consolas" panose="020B0609020204030204" pitchFamily="49" charset="0"/>
+                <a:cs typeface="Arial" panose="020B0604020202020204" pitchFamily="34" charset="0"/>
+              </a:rPr>
+              <a:t> et Mobile </a:t>
+            </a:r>
+            <a:br>
+              <a:rPr lang="fr-FR" sz="1400" dirty="0">
+                <a:latin typeface="Consolas" panose="020B0609020204030204" pitchFamily="49" charset="0"/>
+                <a:cs typeface="Arial" panose="020B0604020202020204" pitchFamily="34" charset="0"/>
+              </a:rPr>
+            </a:br>
+            <a:r>
+              <a:rPr lang="fr-FR" sz="1400" dirty="0">
+                <a:latin typeface="Consolas" panose="020B0609020204030204" pitchFamily="49" charset="0"/>
+                <a:cs typeface="Arial" panose="020B0604020202020204" pitchFamily="34" charset="0"/>
+              </a:rPr>
+              <a:t>	   * hébergement de site P2 sur GitHub Pages: </a:t>
+            </a:r>
+            <a:r>
+              <a:rPr lang="fr-FR" sz="1400" i="1" dirty="0">
+                <a:latin typeface="Consolas" panose="020B0609020204030204" pitchFamily="49" charset="0"/>
+                <a:cs typeface="Arial" panose="020B0604020202020204" pitchFamily="34" charset="0"/>
+              </a:rPr>
+              <a:t>https://sergemiro.github.io/sergiyMirochnyk_2_30032021/  </a:t>
+            </a:r>
+            <a:br>
+              <a:rPr lang="fr-FR" sz="1400" dirty="0">
+                <a:latin typeface="Consolas" panose="020B0609020204030204" pitchFamily="49" charset="0"/>
+                <a:cs typeface="Arial" panose="020B0604020202020204" pitchFamily="34" charset="0"/>
+              </a:rPr>
+            </a:br>
+            <a:r>
+              <a:rPr lang="fr-FR" sz="1400" dirty="0">
+                <a:latin typeface="Consolas" panose="020B0609020204030204" pitchFamily="49" charset="0"/>
+                <a:cs typeface="Arial" panose="020B0604020202020204" pitchFamily="34" charset="0"/>
+              </a:rPr>
+              <a:t>	   * l’envoi de mon dossier P2 à la soutenance</a:t>
+            </a:r>
+            <a:endParaRPr lang="ru-RU" sz="1400" dirty="0">
+              <a:latin typeface="Consolas" panose="020B0609020204030204" pitchFamily="49" charset="0"/>
+              <a:cs typeface="Arial" panose="020B0604020202020204" pitchFamily="34" charset="0"/>
+            </a:endParaRPr>
           </a:p>
         </p:txBody>
       </p:sp>
       <p:pic>
         <p:nvPicPr>
-          <p:cNvPr id="7" name="Content Placeholder 6">
-            <a:extLst>
-              <a:ext uri="{FF2B5EF4-FFF2-40B4-BE49-F238E27FC236}">
-                <a16:creationId xmlns:a16="http://schemas.microsoft.com/office/drawing/2014/main" id="{F49B4099-9343-491B-ADE9-80A858F24251}"/>
+          <p:cNvPr id="11" name="Content Placeholder 10">
+            <a:extLst>
+              <a:ext uri="{FF2B5EF4-FFF2-40B4-BE49-F238E27FC236}">
+                <a16:creationId xmlns:a16="http://schemas.microsoft.com/office/drawing/2014/main" id="{C799EEA0-9857-4369-95FF-01B00F45E142}"/>
               </a:ext>
             </a:extLst>
           </p:cNvPr>
@@ -4621,15 +4330,50 @@
         </p:blipFill>
         <p:spPr>
           <a:xfrm>
-            <a:off x="838201" y="762000"/>
-            <a:ext cx="9682080" cy="5414963"/>
+            <a:off x="1889760" y="1046618"/>
+            <a:ext cx="4958080" cy="5811381"/>
           </a:xfrm>
+        </p:spPr>
+      </p:pic>
+      <p:pic>
+        <p:nvPicPr>
+          <p:cNvPr id="12" name="Content Placeholder 10">
+            <a:extLst>
+              <a:ext uri="{FF2B5EF4-FFF2-40B4-BE49-F238E27FC236}">
+                <a16:creationId xmlns:a16="http://schemas.microsoft.com/office/drawing/2014/main" id="{1CBC214C-7290-47FC-A802-E497B9AA486E}"/>
+              </a:ext>
+            </a:extLst>
+          </p:cNvPr>
+          <p:cNvPicPr>
+            <a:picLocks noChangeAspect="1"/>
+          </p:cNvPicPr>
+          <p:nvPr/>
+        </p:nvPicPr>
+        <p:blipFill>
+          <a:blip r:embed="rId3">
+            <a:extLst>
+              <a:ext uri="{28A0092B-C50C-407E-A947-70E740481C1C}">
+                <a14:useLocalDpi xmlns:a14="http://schemas.microsoft.com/office/drawing/2010/main" val="0"/>
+              </a:ext>
+            </a:extLst>
+          </a:blip>
+          <a:srcRect/>
+          <a:stretch/>
+        </p:blipFill>
+        <p:spPr>
+          <a:xfrm>
+            <a:off x="7680960" y="1046619"/>
+            <a:ext cx="2936240" cy="5709781"/>
+          </a:xfrm>
+          <a:prstGeom prst="rect">
+            <a:avLst/>
+          </a:prstGeom>
         </p:spPr>
       </p:pic>
     </p:spTree>
     <p:extLst>
       <p:ext uri="{BB962C8B-B14F-4D97-AF65-F5344CB8AC3E}">
-        <p14:creationId xmlns:p14="http://schemas.microsoft.com/office/powerpoint/2010/main" val="3398647332"/>
+        <p14:creationId xmlns:p14="http://schemas.microsoft.com/office/powerpoint/2010/main" val="3954535009"/>
       </p:ext>
     </p:extLst>
   </p:cSld>
@@ -4674,8 +4418,8 @@
         </p:nvSpPr>
         <p:spPr>
           <a:xfrm>
-            <a:off x="1209038" y="101600"/>
-            <a:ext cx="10144761" cy="518160"/>
+            <a:off x="838200" y="81280"/>
+            <a:ext cx="10515600" cy="762000"/>
           </a:xfrm>
         </p:spPr>
         <p:txBody>
@@ -4684,10 +4428,6 @@
           </a:bodyPr>
           <a:lstStyle/>
           <a:p>
-            <a:r>
-              <a:rPr lang="fr-FR" sz="1600" dirty="0"/>
-              <a:t>Les balises CSS pour rendre nos filtres comme dans la maquette.</a:t>
-            </a:r>
             <a:endParaRPr lang="ru-RU" sz="1500" dirty="0"/>
           </a:p>
         </p:txBody>
@@ -4697,7 +4437,7 @@
           <p:cNvPr id="6" name="Content Placeholder 5">
             <a:extLst>
               <a:ext uri="{FF2B5EF4-FFF2-40B4-BE49-F238E27FC236}">
-                <a16:creationId xmlns:a16="http://schemas.microsoft.com/office/drawing/2014/main" id="{83F53C3A-62F0-4C83-92AF-F3523917C385}"/>
+                <a16:creationId xmlns:a16="http://schemas.microsoft.com/office/drawing/2014/main" id="{3E211B92-BA76-4840-8109-9EEA0FAC0C83}"/>
               </a:ext>
             </a:extLst>
           </p:cNvPr>
@@ -4722,15 +4462,15 @@
         </p:blipFill>
         <p:spPr>
           <a:xfrm>
-            <a:off x="1209039" y="690880"/>
-            <a:ext cx="9631681" cy="5791200"/>
+            <a:off x="725481" y="299720"/>
+            <a:ext cx="10741037" cy="6258560"/>
           </a:xfrm>
         </p:spPr>
       </p:pic>
     </p:spTree>
     <p:extLst>
       <p:ext uri="{BB962C8B-B14F-4D97-AF65-F5344CB8AC3E}">
-        <p14:creationId xmlns:p14="http://schemas.microsoft.com/office/powerpoint/2010/main" val="738505482"/>
+        <p14:creationId xmlns:p14="http://schemas.microsoft.com/office/powerpoint/2010/main" val="3398647332"/>
       </p:ext>
     </p:extLst>
   </p:cSld>
@@ -4757,64 +4497,12 @@
           <a:chExt cx="0" cy="0"/>
         </a:xfrm>
       </p:grpSpPr>
-      <p:sp>
-        <p:nvSpPr>
-          <p:cNvPr id="2" name="Title 1">
-            <a:extLst>
-              <a:ext uri="{FF2B5EF4-FFF2-40B4-BE49-F238E27FC236}">
-                <a16:creationId xmlns:a16="http://schemas.microsoft.com/office/drawing/2014/main" id="{F49B3595-1527-428D-9FC0-AFFF02A05D97}"/>
-              </a:ext>
-            </a:extLst>
-          </p:cNvPr>
-          <p:cNvSpPr>
-            <a:spLocks noGrp="1"/>
-          </p:cNvSpPr>
-          <p:nvPr>
-            <p:ph type="title"/>
-          </p:nvPr>
-        </p:nvSpPr>
-        <p:spPr>
-          <a:xfrm>
-            <a:off x="838200" y="81280"/>
-            <a:ext cx="10515600" cy="762000"/>
-          </a:xfrm>
-        </p:spPr>
-        <p:txBody>
-          <a:bodyPr>
-            <a:normAutofit/>
-          </a:bodyPr>
-          <a:lstStyle/>
-          <a:p>
-            <a:r>
-              <a:rPr lang="fr-FR" sz="1500" dirty="0"/>
-              <a:t>Les </a:t>
-            </a:r>
-            <a:r>
-              <a:rPr lang="fr-FR" sz="1500" dirty="0" err="1"/>
-              <a:t>cards</a:t>
-            </a:r>
-            <a:r>
-              <a:rPr lang="fr-FR" sz="1500" dirty="0"/>
-              <a:t> «d’</a:t>
-            </a:r>
-            <a:r>
-              <a:rPr lang="fr-FR" sz="1500" dirty="0" err="1"/>
-              <a:t>Hebergement</a:t>
-            </a:r>
-            <a:r>
-              <a:rPr lang="fr-FR" sz="1500" dirty="0"/>
-              <a:t> à Marseille» (HTML)</a:t>
-            </a:r>
-            <a:endParaRPr lang="ru-RU" sz="1500" dirty="0"/>
-          </a:p>
-        </p:txBody>
-      </p:sp>
       <p:pic>
         <p:nvPicPr>
-          <p:cNvPr id="6" name="Content Placeholder 5">
-            <a:extLst>
-              <a:ext uri="{FF2B5EF4-FFF2-40B4-BE49-F238E27FC236}">
-                <a16:creationId xmlns:a16="http://schemas.microsoft.com/office/drawing/2014/main" id="{64DB6E23-2DE6-4A2D-A22D-CDCAF9E1B446}"/>
+          <p:cNvPr id="7" name="Content Placeholder 6">
+            <a:extLst>
+              <a:ext uri="{FF2B5EF4-FFF2-40B4-BE49-F238E27FC236}">
+                <a16:creationId xmlns:a16="http://schemas.microsoft.com/office/drawing/2014/main" id="{8F0DF227-8488-4641-A255-53962A9D5CEC}"/>
               </a:ext>
             </a:extLst>
           </p:cNvPr>
@@ -4839,132 +4527,15 @@
         </p:blipFill>
         <p:spPr>
           <a:xfrm>
-            <a:off x="838200" y="731520"/>
-            <a:ext cx="10165080" cy="5831840"/>
+            <a:off x="3822481" y="946148"/>
+            <a:ext cx="4547037" cy="4965704"/>
           </a:xfrm>
         </p:spPr>
       </p:pic>
     </p:spTree>
     <p:extLst>
       <p:ext uri="{BB962C8B-B14F-4D97-AF65-F5344CB8AC3E}">
-        <p14:creationId xmlns:p14="http://schemas.microsoft.com/office/powerpoint/2010/main" val="936705449"/>
-      </p:ext>
-    </p:extLst>
-  </p:cSld>
-  <p:clrMapOvr>
-    <a:masterClrMapping/>
-  </p:clrMapOvr>
-</p:sld>
-</file>
-
-<file path=ppt/slides/slide9.xml><?xml version="1.0" encoding="utf-8"?>
-<p:sld xmlns:a="http://schemas.openxmlformats.org/drawingml/2006/main" xmlns:r="http://schemas.openxmlformats.org/officeDocument/2006/relationships" xmlns:p="http://schemas.openxmlformats.org/presentationml/2006/main">
-  <p:cSld>
-    <p:spTree>
-      <p:nvGrpSpPr>
-        <p:cNvPr id="1" name=""/>
-        <p:cNvGrpSpPr/>
-        <p:nvPr/>
-      </p:nvGrpSpPr>
-      <p:grpSpPr>
-        <a:xfrm>
-          <a:off x="0" y="0"/>
-          <a:ext cx="0" cy="0"/>
-          <a:chOff x="0" y="0"/>
-          <a:chExt cx="0" cy="0"/>
-        </a:xfrm>
-      </p:grpSpPr>
-      <p:sp>
-        <p:nvSpPr>
-          <p:cNvPr id="2" name="Title 1">
-            <a:extLst>
-              <a:ext uri="{FF2B5EF4-FFF2-40B4-BE49-F238E27FC236}">
-                <a16:creationId xmlns:a16="http://schemas.microsoft.com/office/drawing/2014/main" id="{F49B3595-1527-428D-9FC0-AFFF02A05D97}"/>
-              </a:ext>
-            </a:extLst>
-          </p:cNvPr>
-          <p:cNvSpPr>
-            <a:spLocks noGrp="1"/>
-          </p:cNvSpPr>
-          <p:nvPr>
-            <p:ph type="title"/>
-          </p:nvPr>
-        </p:nvSpPr>
-        <p:spPr>
-          <a:xfrm>
-            <a:off x="1209038" y="101600"/>
-            <a:ext cx="10144761" cy="518160"/>
-          </a:xfrm>
-        </p:spPr>
-        <p:txBody>
-          <a:bodyPr>
-            <a:normAutofit/>
-          </a:bodyPr>
-          <a:lstStyle/>
-          <a:p>
-            <a:r>
-              <a:rPr lang="fr-FR" sz="1600" dirty="0"/>
-              <a:t>Le CSS pour les </a:t>
-            </a:r>
-            <a:r>
-              <a:rPr lang="fr-FR" sz="1600" dirty="0" err="1"/>
-              <a:t>cards</a:t>
-            </a:r>
-            <a:r>
-              <a:rPr lang="fr-FR" sz="1600" dirty="0"/>
-              <a:t>, je l’ai configuré en utilisant </a:t>
-            </a:r>
-            <a:r>
-              <a:rPr lang="fr-FR" sz="1600" dirty="0" err="1"/>
-              <a:t>Flexbox</a:t>
-            </a:r>
-            <a:r>
-              <a:rPr lang="fr-FR" sz="1600" dirty="0"/>
-              <a:t> </a:t>
-            </a:r>
-            <a:endParaRPr lang="ru-RU" sz="1500" dirty="0"/>
-          </a:p>
-        </p:txBody>
-      </p:sp>
-      <p:pic>
-        <p:nvPicPr>
-          <p:cNvPr id="7" name="Content Placeholder 6">
-            <a:extLst>
-              <a:ext uri="{FF2B5EF4-FFF2-40B4-BE49-F238E27FC236}">
-                <a16:creationId xmlns:a16="http://schemas.microsoft.com/office/drawing/2014/main" id="{D84DA03D-75C2-45DD-BC3E-C9032FF22E25}"/>
-              </a:ext>
-            </a:extLst>
-          </p:cNvPr>
-          <p:cNvPicPr>
-            <a:picLocks noGrp="1" noChangeAspect="1"/>
-          </p:cNvPicPr>
-          <p:nvPr>
-            <p:ph idx="1"/>
-          </p:nvPr>
-        </p:nvPicPr>
-        <p:blipFill>
-          <a:blip r:embed="rId2">
-            <a:extLst>
-              <a:ext uri="{28A0092B-C50C-407E-A947-70E740481C1C}">
-                <a14:useLocalDpi xmlns:a14="http://schemas.microsoft.com/office/drawing/2010/main" val="0"/>
-              </a:ext>
-            </a:extLst>
-          </a:blip>
-          <a:stretch>
-            <a:fillRect/>
-          </a:stretch>
-        </p:blipFill>
-        <p:spPr>
-          <a:xfrm>
-            <a:off x="1209038" y="619760"/>
-            <a:ext cx="10144761" cy="5984240"/>
-          </a:xfrm>
-        </p:spPr>
-      </p:pic>
-    </p:spTree>
-    <p:extLst>
-      <p:ext uri="{BB962C8B-B14F-4D97-AF65-F5344CB8AC3E}">
-        <p14:creationId xmlns:p14="http://schemas.microsoft.com/office/powerpoint/2010/main" val="1720654042"/>
+        <p14:creationId xmlns:p14="http://schemas.microsoft.com/office/powerpoint/2010/main" val="2057897185"/>
       </p:ext>
     </p:extLst>
   </p:cSld>

</xml_diff>